<commit_message>
fix spelling mistakes for cbn and first
</commit_message>
<xml_diff>
--- a/Coq LeanProver CheatSheet.pptx
+++ b/Coq LeanProver CheatSheet.pptx
@@ -3396,13 +3396,13 @@
           <p:nvPr>
             <p:extLst>
               <p:ext uri="{D42A27DB-BD31-4B8C-83A1-F6EECF244321}">
-                <p14:modId xmlns:p14="http://schemas.microsoft.com/office/powerpoint/2010/main" val="4289590684"/>
+                <p14:modId xmlns:p14="http://schemas.microsoft.com/office/powerpoint/2010/main" val="3079261325"/>
               </p:ext>
             </p:extLst>
           </p:nvPr>
         </p:nvGraphicFramePr>
         <p:xfrm>
-          <a:off x="94703" y="58930"/>
+          <a:off x="94703" y="58929"/>
           <a:ext cx="3895957" cy="6723378"/>
         </p:xfrm>
         <a:graphic>
@@ -3720,7 +3720,7 @@
                     <a:p>
                       <a:r>
                         <a:rPr lang="en-US" sz="1700"/>
-                        <a:t>cdn</a:t>
+                        <a:t>cbn</a:t>
                       </a:r>
                     </a:p>
                   </a:txBody>
@@ -3967,7 +3967,7 @@
                     <a:p>
                       <a:r>
                         <a:rPr lang="en-US" sz="1700"/>
-                        <a:t>(frist|A|B)</a:t>
+                        <a:t>(first|A|B)</a:t>
                       </a:r>
                     </a:p>
                   </a:txBody>
@@ -4206,14 +4206,14 @@
           <p:nvPr>
             <p:extLst>
               <p:ext uri="{D42A27DB-BD31-4B8C-83A1-F6EECF244321}">
-                <p14:modId xmlns:p14="http://schemas.microsoft.com/office/powerpoint/2010/main" val="3156788819"/>
+                <p14:modId xmlns:p14="http://schemas.microsoft.com/office/powerpoint/2010/main" val="2621677736"/>
               </p:ext>
             </p:extLst>
           </p:nvPr>
         </p:nvGraphicFramePr>
         <p:xfrm>
-          <a:off x="4019618" y="58930"/>
-          <a:ext cx="1437205" cy="4754724"/>
+          <a:off x="4019618" y="58929"/>
+          <a:ext cx="1437205" cy="4597846"/>
         </p:xfrm>
         <a:graphic>
           <a:graphicData uri="http://schemas.openxmlformats.org/drawingml/2006/table">
@@ -4230,7 +4230,7 @@
                   </a:extLst>
                 </a:gridCol>
               </a:tblGrid>
-              <a:tr h="365748">
+              <a:tr h="351694">
                 <a:tc>
                   <a:txBody>
                     <a:bodyPr/>
@@ -4250,7 +4250,7 @@
                   </a:ext>
                 </a:extLst>
               </a:tr>
-              <a:tr h="365748">
+              <a:tr h="353846">
                 <a:tc>
                   <a:txBody>
                     <a:bodyPr/>
@@ -4270,7 +4270,7 @@
                   </a:ext>
                 </a:extLst>
               </a:tr>
-              <a:tr h="365748">
+              <a:tr h="353846">
                 <a:tc>
                   <a:txBody>
                     <a:bodyPr/>
@@ -4290,7 +4290,7 @@
                   </a:ext>
                 </a:extLst>
               </a:tr>
-              <a:tr h="365748">
+              <a:tr h="353846">
                 <a:tc>
                   <a:txBody>
                     <a:bodyPr/>
@@ -4310,7 +4310,7 @@
                   </a:ext>
                 </a:extLst>
               </a:tr>
-              <a:tr h="365748">
+              <a:tr h="353846">
                 <a:tc>
                   <a:txBody>
                     <a:bodyPr/>
@@ -4330,7 +4330,7 @@
                   </a:ext>
                 </a:extLst>
               </a:tr>
-              <a:tr h="365748">
+              <a:tr h="353846">
                 <a:tc>
                   <a:txBody>
                     <a:bodyPr/>
@@ -4350,7 +4350,7 @@
                   </a:ext>
                 </a:extLst>
               </a:tr>
-              <a:tr h="365748">
+              <a:tr h="353846">
                 <a:tc>
                   <a:txBody>
                     <a:bodyPr/>
@@ -4379,7 +4379,7 @@
                   </a:ext>
                 </a:extLst>
               </a:tr>
-              <a:tr h="365748">
+              <a:tr h="353846">
                 <a:tc>
                   <a:txBody>
                     <a:bodyPr/>
@@ -4408,7 +4408,7 @@
                   </a:ext>
                 </a:extLst>
               </a:tr>
-              <a:tr h="365748">
+              <a:tr h="353846">
                 <a:tc>
                   <a:txBody>
                     <a:bodyPr/>
@@ -4437,7 +4437,7 @@
                   </a:ext>
                 </a:extLst>
               </a:tr>
-              <a:tr h="365748">
+              <a:tr h="353846">
                 <a:tc>
                   <a:txBody>
                     <a:bodyPr/>
@@ -4466,7 +4466,7 @@
                   </a:ext>
                 </a:extLst>
               </a:tr>
-              <a:tr h="365748">
+              <a:tr h="353846">
                 <a:tc>
                   <a:txBody>
                     <a:bodyPr/>
@@ -4486,7 +4486,7 @@
                   </a:ext>
                 </a:extLst>
               </a:tr>
-              <a:tr h="365748">
+              <a:tr h="353846">
                 <a:tc>
                   <a:txBody>
                     <a:bodyPr/>
@@ -4515,7 +4515,7 @@
                   </a:ext>
                 </a:extLst>
               </a:tr>
-              <a:tr h="365748">
+              <a:tr h="353846">
                 <a:tc>
                   <a:txBody>
                     <a:bodyPr/>
@@ -4563,13 +4563,13 @@
           <p:nvPr>
             <p:extLst>
               <p:ext uri="{D42A27DB-BD31-4B8C-83A1-F6EECF244321}">
-                <p14:modId xmlns:p14="http://schemas.microsoft.com/office/powerpoint/2010/main" val="114395641"/>
+                <p14:modId xmlns:p14="http://schemas.microsoft.com/office/powerpoint/2010/main" val="1050549768"/>
               </p:ext>
             </p:extLst>
           </p:nvPr>
         </p:nvGraphicFramePr>
         <p:xfrm>
-          <a:off x="5485782" y="58930"/>
+          <a:off x="5485782" y="58929"/>
           <a:ext cx="1803796" cy="1762820"/>
         </p:xfrm>
         <a:graphic>

</xml_diff>

<commit_message>
more cheats for the cheat sheet: in is at
</commit_message>
<xml_diff>
--- a/Coq LeanProver CheatSheet.pptx
+++ b/Coq LeanProver CheatSheet.pptx
@@ -196,7 +196,7 @@
           </a:lstStyle>
           <a:p>
             <a:fld id="{A1CD23A5-D09B-2545-BEED-5A0835115B69}" type="datetimeFigureOut">
-              <a:t>7/24/23</a:t>
+              <a:t>7/25/23</a:t>
             </a:fld>
             <a:endParaRPr lang="en-US"/>
           </a:p>
@@ -676,7 +676,7 @@
           <a:lstStyle/>
           <a:p>
             <a:fld id="{EA13D3C9-45E6-EC4D-95F7-CC6A702D7043}" type="datetimeFigureOut">
-              <a:t>7/24/23</a:t>
+              <a:t>7/25/23</a:t>
             </a:fld>
             <a:endParaRPr lang="en-US"/>
           </a:p>
@@ -844,7 +844,7 @@
           <a:lstStyle/>
           <a:p>
             <a:fld id="{EA13D3C9-45E6-EC4D-95F7-CC6A702D7043}" type="datetimeFigureOut">
-              <a:t>7/24/23</a:t>
+              <a:t>7/25/23</a:t>
             </a:fld>
             <a:endParaRPr lang="en-US"/>
           </a:p>
@@ -1022,7 +1022,7 @@
           <a:lstStyle/>
           <a:p>
             <a:fld id="{EA13D3C9-45E6-EC4D-95F7-CC6A702D7043}" type="datetimeFigureOut">
-              <a:t>7/24/23</a:t>
+              <a:t>7/25/23</a:t>
             </a:fld>
             <a:endParaRPr lang="en-US"/>
           </a:p>
@@ -1190,7 +1190,7 @@
           <a:lstStyle/>
           <a:p>
             <a:fld id="{EA13D3C9-45E6-EC4D-95F7-CC6A702D7043}" type="datetimeFigureOut">
-              <a:t>7/24/23</a:t>
+              <a:t>7/25/23</a:t>
             </a:fld>
             <a:endParaRPr lang="en-US"/>
           </a:p>
@@ -1432,7 +1432,7 @@
           <a:lstStyle/>
           <a:p>
             <a:fld id="{EA13D3C9-45E6-EC4D-95F7-CC6A702D7043}" type="datetimeFigureOut">
-              <a:t>7/24/23</a:t>
+              <a:t>7/25/23</a:t>
             </a:fld>
             <a:endParaRPr lang="en-US"/>
           </a:p>
@@ -1662,7 +1662,7 @@
           <a:lstStyle/>
           <a:p>
             <a:fld id="{EA13D3C9-45E6-EC4D-95F7-CC6A702D7043}" type="datetimeFigureOut">
-              <a:t>7/24/23</a:t>
+              <a:t>7/25/23</a:t>
             </a:fld>
             <a:endParaRPr lang="en-US"/>
           </a:p>
@@ -2027,7 +2027,7 @@
           <a:lstStyle/>
           <a:p>
             <a:fld id="{EA13D3C9-45E6-EC4D-95F7-CC6A702D7043}" type="datetimeFigureOut">
-              <a:t>7/24/23</a:t>
+              <a:t>7/25/23</a:t>
             </a:fld>
             <a:endParaRPr lang="en-US"/>
           </a:p>
@@ -2143,7 +2143,7 @@
           <a:lstStyle/>
           <a:p>
             <a:fld id="{EA13D3C9-45E6-EC4D-95F7-CC6A702D7043}" type="datetimeFigureOut">
-              <a:t>7/24/23</a:t>
+              <a:t>7/25/23</a:t>
             </a:fld>
             <a:endParaRPr lang="en-US"/>
           </a:p>
@@ -2236,7 +2236,7 @@
           <a:lstStyle/>
           <a:p>
             <a:fld id="{EA13D3C9-45E6-EC4D-95F7-CC6A702D7043}" type="datetimeFigureOut">
-              <a:t>7/24/23</a:t>
+              <a:t>7/25/23</a:t>
             </a:fld>
             <a:endParaRPr lang="en-US"/>
           </a:p>
@@ -2511,7 +2511,7 @@
           <a:lstStyle/>
           <a:p>
             <a:fld id="{EA13D3C9-45E6-EC4D-95F7-CC6A702D7043}" type="datetimeFigureOut">
-              <a:t>7/24/23</a:t>
+              <a:t>7/25/23</a:t>
             </a:fld>
             <a:endParaRPr lang="en-US"/>
           </a:p>
@@ -2766,7 +2766,7 @@
           <a:lstStyle/>
           <a:p>
             <a:fld id="{EA13D3C9-45E6-EC4D-95F7-CC6A702D7043}" type="datetimeFigureOut">
-              <a:t>7/24/23</a:t>
+              <a:t>7/25/23</a:t>
             </a:fld>
             <a:endParaRPr lang="en-US"/>
           </a:p>
@@ -2977,7 +2977,7 @@
           </a:lstStyle>
           <a:p>
             <a:fld id="{EA13D3C9-45E6-EC4D-95F7-CC6A702D7043}" type="datetimeFigureOut">
-              <a:t>7/24/23</a:t>
+              <a:t>7/25/23</a:t>
             </a:fld>
             <a:endParaRPr lang="en-US"/>
           </a:p>
@@ -3396,14 +3396,14 @@
           <p:nvPr>
             <p:extLst>
               <p:ext uri="{D42A27DB-BD31-4B8C-83A1-F6EECF244321}">
-                <p14:modId xmlns:p14="http://schemas.microsoft.com/office/powerpoint/2010/main" val="3079261325"/>
+                <p14:modId xmlns:p14="http://schemas.microsoft.com/office/powerpoint/2010/main" val="1092865532"/>
               </p:ext>
             </p:extLst>
           </p:nvPr>
         </p:nvGraphicFramePr>
         <p:xfrm>
-          <a:off x="94703" y="58929"/>
-          <a:ext cx="3895957" cy="6723378"/>
+          <a:off x="94703" y="58930"/>
+          <a:ext cx="3895957" cy="6370320"/>
         </p:xfrm>
         <a:graphic>
           <a:graphicData uri="http://schemas.openxmlformats.org/drawingml/2006/table">
@@ -3427,14 +3427,14 @@
                   </a:extLst>
                 </a:gridCol>
               </a:tblGrid>
-              <a:tr h="353862">
+              <a:tr h="323265">
                 <a:tc>
                   <a:txBody>
                     <a:bodyPr/>
                     <a:lstStyle/>
                     <a:p>
                       <a:r>
-                        <a:rPr lang="en-US" sz="1700"/>
+                        <a:rPr lang="en-US" sz="1600"/>
                         <a:t>Coq Proof Assistant</a:t>
                       </a:r>
                     </a:p>
@@ -3447,7 +3447,7 @@
                     <a:lstStyle/>
                     <a:p>
                       <a:r>
-                        <a:rPr lang="en-US" sz="1700"/>
+                        <a:rPr lang="en-US" sz="1600"/>
                         <a:t>LeanProver</a:t>
                       </a:r>
                     </a:p>
@@ -3460,14 +3460,14 @@
                   </a:ext>
                 </a:extLst>
               </a:tr>
-              <a:tr h="353862">
+              <a:tr h="323265">
                 <a:tc>
                   <a:txBody>
                     <a:bodyPr/>
                     <a:lstStyle/>
                     <a:p>
                       <a:r>
-                        <a:rPr lang="en-US" sz="1700"/>
+                        <a:rPr lang="en-US" sz="1600"/>
                         <a:t>Theorem</a:t>
                       </a:r>
                     </a:p>
@@ -3480,7 +3480,7 @@
                     <a:lstStyle/>
                     <a:p>
                       <a:r>
-                        <a:rPr lang="en-US" sz="1700"/>
+                        <a:rPr lang="en-US" sz="1600"/>
                         <a:t>theorem</a:t>
                       </a:r>
                     </a:p>
@@ -3493,14 +3493,14 @@
                   </a:ext>
                 </a:extLst>
               </a:tr>
-              <a:tr h="353862">
+              <a:tr h="323265">
                 <a:tc>
                   <a:txBody>
                     <a:bodyPr/>
                     <a:lstStyle/>
                     <a:p>
                       <a:r>
-                        <a:rPr lang="en-US" sz="1700"/>
+                        <a:rPr lang="en-US" sz="1600"/>
                         <a:t>admit</a:t>
                       </a:r>
                     </a:p>
@@ -3513,7 +3513,7 @@
                     <a:lstStyle/>
                     <a:p>
                       <a:r>
-                        <a:rPr lang="en-US" sz="1700"/>
+                        <a:rPr lang="en-US" sz="1600"/>
                         <a:t>sorry</a:t>
                       </a:r>
                     </a:p>
@@ -3526,14 +3526,14 @@
                   </a:ext>
                 </a:extLst>
               </a:tr>
-              <a:tr h="353862">
+              <a:tr h="323265">
                 <a:tc>
                   <a:txBody>
                     <a:bodyPr/>
                     <a:lstStyle/>
                     <a:p>
                       <a:r>
-                        <a:rPr lang="en-GB" sz="1700" b="0" i="0" kern="1200">
+                        <a:rPr lang="en-GB" sz="1600" b="0" i="0" kern="1200">
                           <a:solidFill>
                             <a:schemeClr val="dk1"/>
                           </a:solidFill>
@@ -3544,7 +3544,7 @@
                         </a:rPr>
                         <a:t>reflexivity</a:t>
                       </a:r>
-                      <a:endParaRPr lang="en-US" sz="1700"/>
+                      <a:endParaRPr lang="en-US" sz="1600"/>
                     </a:p>
                   </a:txBody>
                   <a:tcPr/>
@@ -3555,7 +3555,7 @@
                     <a:lstStyle/>
                     <a:p>
                       <a:r>
-                        <a:rPr lang="en-GB" sz="1700" b="0" i="0" kern="1200">
+                        <a:rPr lang="en-GB" sz="1600" b="0" i="0" kern="1200">
                           <a:solidFill>
                             <a:schemeClr val="dk1"/>
                           </a:solidFill>
@@ -3566,7 +3566,7 @@
                         </a:rPr>
                         <a:t>rfl</a:t>
                       </a:r>
-                      <a:endParaRPr lang="en-US" sz="1700"/>
+                      <a:endParaRPr lang="en-US" sz="1600"/>
                     </a:p>
                   </a:txBody>
                   <a:tcPr/>
@@ -3577,14 +3577,14 @@
                   </a:ext>
                 </a:extLst>
               </a:tr>
-              <a:tr h="353862">
+              <a:tr h="323265">
                 <a:tc>
                   <a:txBody>
                     <a:bodyPr/>
                     <a:lstStyle/>
                     <a:p>
                       <a:r>
-                        <a:rPr lang="en-GB" sz="1700" b="0" i="0" kern="1200">
+                        <a:rPr lang="en-GB" sz="1600" b="0" i="0" kern="1200">
                           <a:solidFill>
                             <a:schemeClr val="dk1"/>
                           </a:solidFill>
@@ -3595,7 +3595,7 @@
                         </a:rPr>
                         <a:t>rewrite H</a:t>
                       </a:r>
-                      <a:endParaRPr lang="en-US" sz="1700"/>
+                      <a:endParaRPr lang="en-US" sz="1600"/>
                     </a:p>
                   </a:txBody>
                   <a:tcPr/>
@@ -3606,7 +3606,7 @@
                     <a:lstStyle/>
                     <a:p>
                       <a:r>
-                        <a:rPr lang="en-GB" sz="1700" b="0" i="0" kern="1200">
+                        <a:rPr lang="en-GB" sz="1600" b="0" i="0" kern="1200">
                           <a:solidFill>
                             <a:schemeClr val="dk1"/>
                           </a:solidFill>
@@ -3617,7 +3617,7 @@
                         </a:rPr>
                         <a:t>rw [H]</a:t>
                       </a:r>
-                      <a:endParaRPr lang="en-US" sz="1700"/>
+                      <a:endParaRPr lang="en-US" sz="1600"/>
                     </a:p>
                   </a:txBody>
                   <a:tcPr/>
@@ -3628,14 +3628,14 @@
                   </a:ext>
                 </a:extLst>
               </a:tr>
-              <a:tr h="353862">
+              <a:tr h="323265">
                 <a:tc>
                   <a:txBody>
                     <a:bodyPr/>
                     <a:lstStyle/>
                     <a:p>
                       <a:r>
-                        <a:rPr lang="en-GB" sz="1700" b="0" i="0" kern="1200">
+                        <a:rPr lang="en-GB" sz="1600" b="0" i="0" kern="1200">
                           <a:solidFill>
                             <a:schemeClr val="dk1"/>
                           </a:solidFill>
@@ -3646,7 +3646,7 @@
                         </a:rPr>
                         <a:t>rewrite &lt;- H</a:t>
                       </a:r>
-                      <a:endParaRPr lang="en-US" sz="1700"/>
+                      <a:endParaRPr lang="en-US" sz="1600"/>
                     </a:p>
                   </a:txBody>
                   <a:tcPr/>
@@ -3657,7 +3657,7 @@
                     <a:lstStyle/>
                     <a:p>
                       <a:r>
-                        <a:rPr lang="en-GB" sz="1700" b="0" i="0" kern="1200">
+                        <a:rPr lang="en-GB" sz="1600" b="0" i="0" kern="1200">
                           <a:solidFill>
                             <a:schemeClr val="dk1"/>
                           </a:solidFill>
@@ -3668,7 +3668,7 @@
                         </a:rPr>
                         <a:t>rw [&lt;- H]</a:t>
                       </a:r>
-                      <a:endParaRPr lang="en-US" sz="1700"/>
+                      <a:endParaRPr lang="en-US" sz="1600"/>
                     </a:p>
                   </a:txBody>
                   <a:tcPr/>
@@ -3679,15 +3679,15 @@
                   </a:ext>
                 </a:extLst>
               </a:tr>
-              <a:tr h="353862">
+              <a:tr h="323265">
                 <a:tc>
                   <a:txBody>
                     <a:bodyPr/>
                     <a:lstStyle/>
                     <a:p>
                       <a:r>
-                        <a:rPr lang="en-US" sz="1700"/>
-                        <a:t>simpl</a:t>
+                        <a:rPr lang="en-US" sz="1600"/>
+                        <a:t>simpl, cbn, auto</a:t>
                       </a:r>
                     </a:p>
                   </a:txBody>
@@ -3699,8 +3699,8 @@
                     <a:lstStyle/>
                     <a:p>
                       <a:r>
-                        <a:rPr lang="en-US" sz="1700"/>
-                        <a:t>simp</a:t>
+                        <a:rPr lang="en-US" sz="1600"/>
+                        <a:t>simp, dsimp</a:t>
                       </a:r>
                     </a:p>
                   </a:txBody>
@@ -3712,15 +3712,116 @@
                   </a:ext>
                 </a:extLst>
               </a:tr>
-              <a:tr h="353862">
+              <a:tr h="323265">
+                <a:tc>
+                  <a:txBody>
+                    <a:bodyPr/>
+                    <a:lstStyle/>
+                    <a:p>
+                      <a:pPr marL="0" marR="0" lvl="0" indent="0" algn="l" defTabSz="914400" rtl="0" eaLnBrk="1" fontAlgn="auto" latinLnBrk="0" hangingPunct="1">
+                        <a:lnSpc>
+                          <a:spcPct val="100000"/>
+                        </a:lnSpc>
+                        <a:spcBef>
+                          <a:spcPts val="0"/>
+                        </a:spcBef>
+                        <a:spcAft>
+                          <a:spcPts val="0"/>
+                        </a:spcAft>
+                        <a:buClrTx/>
+                        <a:buSzTx/>
+                        <a:buFontTx/>
+                        <a:buNone/>
+                        <a:tabLst/>
+                        <a:defRPr/>
+                      </a:pPr>
+                      <a:r>
+                        <a:rPr lang="en-GB" sz="1600" b="0" i="0" kern="1200">
+                          <a:solidFill>
+                            <a:schemeClr val="dk1"/>
+                          </a:solidFill>
+                          <a:effectLst/>
+                          <a:latin typeface="+mn-lt"/>
+                          <a:ea typeface="+mn-ea"/>
+                          <a:cs typeface="+mn-cs"/>
+                        </a:rPr>
+                        <a:t>destruct, case, elim</a:t>
+                      </a:r>
+                      <a:endParaRPr lang="en-US" sz="1600"/>
+                    </a:p>
+                  </a:txBody>
+                  <a:tcPr/>
+                </a:tc>
                 <a:tc>
                   <a:txBody>
                     <a:bodyPr/>
                     <a:lstStyle/>
                     <a:p>
                       <a:r>
-                        <a:rPr lang="en-US" sz="1700"/>
-                        <a:t>cbn</a:t>
+                        <a:rPr lang="en-US" sz="1600"/>
+                        <a:t>cases</a:t>
+                      </a:r>
+                    </a:p>
+                  </a:txBody>
+                  <a:tcPr/>
+                </a:tc>
+                <a:extLst>
+                  <a:ext uri="{0D108BD9-81ED-4DB2-BD59-A6C34878D82A}">
+                    <a16:rowId xmlns:a16="http://schemas.microsoft.com/office/drawing/2014/main" val="479639300"/>
+                  </a:ext>
+                </a:extLst>
+              </a:tr>
+              <a:tr h="323265">
+                <a:tc>
+                  <a:txBody>
+                    <a:bodyPr/>
+                    <a:lstStyle/>
+                    <a:p>
+                      <a:r>
+                        <a:rPr lang="en-GB" sz="1600" b="0" i="0" kern="1200">
+                          <a:solidFill>
+                            <a:schemeClr val="dk1"/>
+                          </a:solidFill>
+                          <a:effectLst/>
+                          <a:latin typeface="+mn-lt"/>
+                          <a:ea typeface="+mn-ea"/>
+                          <a:cs typeface="+mn-cs"/>
+                        </a:rPr>
+                        <a:t>discriminate</a:t>
+                      </a:r>
+                      <a:endParaRPr lang="en-US" sz="1600"/>
+                    </a:p>
+                  </a:txBody>
+                  <a:tcPr/>
+                </a:tc>
+                <a:tc>
+                  <a:txBody>
+                    <a:bodyPr/>
+                    <a:lstStyle/>
+                    <a:p>
+                      <a:r>
+                        <a:rPr lang="en-US" sz="1600"/>
+                        <a:t>contradiction</a:t>
+                      </a:r>
+                    </a:p>
+                  </a:txBody>
+                  <a:tcPr/>
+                </a:tc>
+                <a:extLst>
+                  <a:ext uri="{0D108BD9-81ED-4DB2-BD59-A6C34878D82A}">
+                    <a16:rowId xmlns:a16="http://schemas.microsoft.com/office/drawing/2014/main" val="3181105943"/>
+                  </a:ext>
+                </a:extLst>
+              </a:tr>
+              <a:tr h="323265">
+                <a:tc>
+                  <a:txBody>
+                    <a:bodyPr/>
+                    <a:lstStyle/>
+                    <a:p>
+                      <a:r>
+                        <a:rPr lang="en-US" sz="1600"/>
+                        <a:t>remember, assert, pose</a:t>
                       </a:r>
                     </a:p>
                   </a:txBody>
@@ -3732,83 +3833,8 @@
                     <a:lstStyle/>
                     <a:p>
                       <a:r>
-                        <a:rPr lang="en-US" sz="1700"/>
-                        <a:t>dsimp</a:t>
-                      </a:r>
-                    </a:p>
-                  </a:txBody>
-                  <a:tcPr/>
-                </a:tc>
-                <a:extLst>
-                  <a:ext uri="{0D108BD9-81ED-4DB2-BD59-A6C34878D82A}">
-                    <a16:rowId xmlns:a16="http://schemas.microsoft.com/office/drawing/2014/main" val="479639300"/>
-                  </a:ext>
-                </a:extLst>
-              </a:tr>
-              <a:tr h="353862">
-                <a:tc>
-                  <a:txBody>
-                    <a:bodyPr/>
-                    <a:lstStyle/>
-                    <a:p>
-                      <a:r>
-                        <a:rPr lang="en-US" sz="1700"/>
-                        <a:t>auto</a:t>
-                      </a:r>
-                    </a:p>
-                  </a:txBody>
-                  <a:tcPr/>
-                </a:tc>
-                <a:tc>
-                  <a:txBody>
-                    <a:bodyPr/>
-                    <a:lstStyle/>
-                    <a:p>
-                      <a:r>
-                        <a:rPr lang="en-US" sz="1700"/>
-                        <a:t>simp</a:t>
-                      </a:r>
-                    </a:p>
-                  </a:txBody>
-                  <a:tcPr/>
-                </a:tc>
-                <a:extLst>
-                  <a:ext uri="{0D108BD9-81ED-4DB2-BD59-A6C34878D82A}">
-                    <a16:rowId xmlns:a16="http://schemas.microsoft.com/office/drawing/2014/main" val="3181105943"/>
-                  </a:ext>
-                </a:extLst>
-              </a:tr>
-              <a:tr h="353862">
-                <a:tc>
-                  <a:txBody>
-                    <a:bodyPr/>
-                    <a:lstStyle/>
-                    <a:p>
-                      <a:r>
-                        <a:rPr lang="en-GB" sz="1700" b="0" i="0" kern="1200">
-                          <a:solidFill>
-                            <a:schemeClr val="dk1"/>
-                          </a:solidFill>
-                          <a:effectLst/>
-                          <a:latin typeface="+mn-lt"/>
-                          <a:ea typeface="+mn-ea"/>
-                          <a:cs typeface="+mn-cs"/>
-                        </a:rPr>
-                        <a:t>discriminate</a:t>
-                      </a:r>
-                      <a:endParaRPr lang="en-US" sz="1700"/>
-                    </a:p>
-                  </a:txBody>
-                  <a:tcPr/>
-                </a:tc>
-                <a:tc>
-                  <a:txBody>
-                    <a:bodyPr/>
-                    <a:lstStyle/>
-                    <a:p>
-                      <a:r>
-                        <a:rPr lang="en-US" sz="1700"/>
-                        <a:t>contradiction</a:t>
+                        <a:rPr lang="en-US" sz="1600"/>
+                        <a:t>have</a:t>
                       </a:r>
                     </a:p>
                   </a:txBody>
@@ -3820,25 +3846,16 @@
                   </a:ext>
                 </a:extLst>
               </a:tr>
-              <a:tr h="353862">
+              <a:tr h="323265">
                 <a:tc>
                   <a:txBody>
                     <a:bodyPr/>
                     <a:lstStyle/>
                     <a:p>
                       <a:r>
-                        <a:rPr lang="en-GB" sz="1700" b="0" i="0" kern="1200">
-                          <a:solidFill>
-                            <a:schemeClr val="dk1"/>
-                          </a:solidFill>
-                          <a:effectLst/>
-                          <a:latin typeface="+mn-lt"/>
-                          <a:ea typeface="+mn-ea"/>
-                          <a:cs typeface="+mn-cs"/>
-                        </a:rPr>
-                        <a:t>destruct, case, elim</a:t>
+                        <a:rPr lang="en-US" sz="1600"/>
+                        <a:t>subst</a:t>
                       </a:r>
-                      <a:endParaRPr lang="en-US" sz="1700"/>
                     </a:p>
                   </a:txBody>
                   <a:tcPr/>
@@ -3848,9 +3865,26 @@
                     <a:bodyPr/>
                     <a:lstStyle/>
                     <a:p>
+                      <a:pPr marL="0" marR="0" lvl="0" indent="0" algn="l" defTabSz="914400" rtl="0" eaLnBrk="1" fontAlgn="auto" latinLnBrk="0" hangingPunct="1">
+                        <a:lnSpc>
+                          <a:spcPct val="100000"/>
+                        </a:lnSpc>
+                        <a:spcBef>
+                          <a:spcPts val="0"/>
+                        </a:spcBef>
+                        <a:spcAft>
+                          <a:spcPts val="0"/>
+                        </a:spcAft>
+                        <a:buClrTx/>
+                        <a:buSzTx/>
+                        <a:buFontTx/>
+                        <a:buNone/>
+                        <a:tabLst/>
+                        <a:defRPr/>
+                      </a:pPr>
                       <a:r>
-                        <a:rPr lang="en-US" sz="1700"/>
-                        <a:t>cases</a:t>
+                        <a:rPr lang="en-US" sz="1600"/>
+                        <a:t>subst_vars</a:t>
                       </a:r>
                     </a:p>
                   </a:txBody>
@@ -3862,14 +3896,14 @@
                   </a:ext>
                 </a:extLst>
               </a:tr>
-              <a:tr h="353862">
+              <a:tr h="323265">
                 <a:tc>
                   <a:txBody>
                     <a:bodyPr/>
                     <a:lstStyle/>
                     <a:p>
                       <a:r>
-                        <a:rPr lang="en-GB" sz="1700" b="0" i="0" kern="1200">
+                        <a:rPr lang="en-GB" sz="1600" b="0" i="0" kern="1200">
                           <a:solidFill>
                             <a:schemeClr val="dk1"/>
                           </a:solidFill>
@@ -3880,7 +3914,7 @@
                         </a:rPr>
                         <a:t>;</a:t>
                       </a:r>
-                      <a:endParaRPr lang="en-US" sz="1700"/>
+                      <a:endParaRPr lang="en-US" sz="1600"/>
                     </a:p>
                   </a:txBody>
                   <a:tcPr/>
@@ -3891,7 +3925,7 @@
                     <a:lstStyle/>
                     <a:p>
                       <a:r>
-                        <a:rPr lang="en-US" sz="1700"/>
+                        <a:rPr lang="en-US" sz="1600"/>
                         <a:t>&lt;;&gt;</a:t>
                       </a:r>
                     </a:p>
@@ -3904,14 +3938,14 @@
                   </a:ext>
                 </a:extLst>
               </a:tr>
-              <a:tr h="353862">
+              <a:tr h="323265">
                 <a:tc>
                   <a:txBody>
                     <a:bodyPr/>
                     <a:lstStyle/>
                     <a:p>
                       <a:r>
-                        <a:rPr lang="en-US" sz="1700"/>
+                        <a:rPr lang="en-US" sz="1600"/>
                         <a:t>-</a:t>
                       </a:r>
                     </a:p>
@@ -3924,7 +3958,7 @@
                     <a:lstStyle/>
                     <a:p>
                       <a:r>
-                        <a:rPr lang="en-US" sz="1700"/>
+                        <a:rPr lang="en-US" sz="1600"/>
                         <a:t>\.</a:t>
                       </a:r>
                     </a:p>
@@ -3937,25 +3971,16 @@
                   </a:ext>
                 </a:extLst>
               </a:tr>
-              <a:tr h="353862">
+              <a:tr h="323265">
                 <a:tc>
                   <a:txBody>
                     <a:bodyPr/>
                     <a:lstStyle/>
                     <a:p>
                       <a:r>
-                        <a:rPr lang="en-GB" sz="1700" b="0" i="0" kern="1200">
-                          <a:solidFill>
-                            <a:schemeClr val="dk1"/>
-                          </a:solidFill>
-                          <a:effectLst/>
-                          <a:latin typeface="+mn-lt"/>
-                          <a:ea typeface="+mn-ea"/>
-                          <a:cs typeface="+mn-cs"/>
-                        </a:rPr>
+                        <a:rPr lang="en-US" sz="1600"/>
                         <a:t>A|B</a:t>
                       </a:r>
-                      <a:endParaRPr lang="en-US" sz="1700"/>
                     </a:p>
                   </a:txBody>
                   <a:tcPr/>
@@ -3966,7 +3991,7 @@
                     <a:lstStyle/>
                     <a:p>
                       <a:r>
-                        <a:rPr lang="en-US" sz="1700"/>
+                        <a:rPr lang="en-US" sz="1600"/>
                         <a:t>(first|A|B)</a:t>
                       </a:r>
                     </a:p>
@@ -3979,15 +4004,15 @@
                   </a:ext>
                 </a:extLst>
               </a:tr>
-              <a:tr h="353862">
+              <a:tr h="323265">
                 <a:tc>
                   <a:txBody>
                     <a:bodyPr/>
                     <a:lstStyle/>
                     <a:p>
                       <a:r>
-                        <a:rPr lang="en-US" sz="1700"/>
-                        <a:t>subst</a:t>
+                        <a:rPr lang="en-US" sz="1600"/>
+                        <a:t>in</a:t>
                       </a:r>
                     </a:p>
                   </a:txBody>
@@ -3999,8 +4024,8 @@
                     <a:lstStyle/>
                     <a:p>
                       <a:r>
-                        <a:rPr lang="en-US" sz="1700"/>
-                        <a:t>subst_vars</a:t>
+                        <a:rPr lang="en-US" sz="1600"/>
+                        <a:t>at</a:t>
                       </a:r>
                     </a:p>
                   </a:txBody>
@@ -4012,14 +4037,14 @@
                   </a:ext>
                 </a:extLst>
               </a:tr>
-              <a:tr h="353862">
+              <a:tr h="323265">
                 <a:tc>
                   <a:txBody>
                     <a:bodyPr/>
                     <a:lstStyle/>
                     <a:p>
                       <a:r>
-                        <a:rPr lang="en-GB" sz="1700" b="0" i="0" kern="1200">
+                        <a:rPr lang="en-GB" sz="1600" b="0" i="0" kern="1200">
                           <a:solidFill>
                             <a:schemeClr val="dk1"/>
                           </a:solidFill>
@@ -4030,7 +4055,7 @@
                         </a:rPr>
                         <a:t>generalize dependent</a:t>
                       </a:r>
-                      <a:endParaRPr lang="en-US" sz="1700"/>
+                      <a:endParaRPr lang="en-US" sz="1600"/>
                     </a:p>
                   </a:txBody>
                   <a:tcPr/>
@@ -4041,7 +4066,7 @@
                     <a:lstStyle/>
                     <a:p>
                       <a:r>
-                        <a:rPr lang="en-GB" sz="1700" b="0" i="0" kern="1200">
+                        <a:rPr lang="en-GB" sz="1600" b="0" i="0" kern="1200">
                           <a:solidFill>
                             <a:schemeClr val="dk1"/>
                           </a:solidFill>
@@ -4052,7 +4077,7 @@
                         </a:rPr>
                         <a:t>revert</a:t>
                       </a:r>
-                      <a:endParaRPr lang="en-US" sz="1700"/>
+                      <a:endParaRPr lang="en-US" sz="1600"/>
                     </a:p>
                   </a:txBody>
                   <a:tcPr/>
@@ -4063,47 +4088,14 @@
                   </a:ext>
                 </a:extLst>
               </a:tr>
-              <a:tr h="353862">
+              <a:tr h="323265">
                 <a:tc>
                   <a:txBody>
                     <a:bodyPr/>
                     <a:lstStyle/>
                     <a:p>
                       <a:r>
-                        <a:rPr lang="en-US" sz="1700"/>
-                        <a:t>remember</a:t>
-                      </a:r>
-                    </a:p>
-                  </a:txBody>
-                  <a:tcPr/>
-                </a:tc>
-                <a:tc>
-                  <a:txBody>
-                    <a:bodyPr/>
-                    <a:lstStyle/>
-                    <a:p>
-                      <a:r>
-                        <a:rPr lang="en-US" sz="1700"/>
-                        <a:t>have</a:t>
-                      </a:r>
-                    </a:p>
-                  </a:txBody>
-                  <a:tcPr/>
-                </a:tc>
-                <a:extLst>
-                  <a:ext uri="{0D108BD9-81ED-4DB2-BD59-A6C34878D82A}">
-                    <a16:rowId xmlns:a16="http://schemas.microsoft.com/office/drawing/2014/main" val="3386152170"/>
-                  </a:ext>
-                </a:extLst>
-              </a:tr>
-              <a:tr h="353862">
-                <a:tc>
-                  <a:txBody>
-                    <a:bodyPr/>
-                    <a:lstStyle/>
-                    <a:p>
-                      <a:r>
-                        <a:rPr lang="en-US" sz="1700"/>
+                        <a:rPr lang="en-US" sz="1600"/>
                         <a:t>split</a:t>
                       </a:r>
                     </a:p>
@@ -4116,7 +4108,7 @@
                     <a:lstStyle/>
                     <a:p>
                       <a:r>
-                        <a:rPr lang="en-US" sz="1700"/>
+                        <a:rPr lang="en-US" sz="1600"/>
                         <a:t>apply And.intro</a:t>
                       </a:r>
                     </a:p>
@@ -4129,14 +4121,14 @@
                   </a:ext>
                 </a:extLst>
               </a:tr>
-              <a:tr h="353862">
+              <a:tr h="323265">
                 <a:tc>
                   <a:txBody>
                     <a:bodyPr/>
                     <a:lstStyle/>
                     <a:p>
                       <a:r>
-                        <a:rPr lang="en-US" sz="1700"/>
+                        <a:rPr lang="en-US" sz="1600"/>
                         <a:t>symmetry</a:t>
                       </a:r>
                     </a:p>
@@ -4166,7 +4158,7 @@
                         <a:defRPr/>
                       </a:pPr>
                       <a:r>
-                        <a:rPr lang="en-GB" sz="1700" b="0" kern="1200">
+                        <a:rPr lang="en-GB" sz="1600" b="0" kern="1200">
                           <a:solidFill>
                             <a:schemeClr val="dk1"/>
                           </a:solidFill>
@@ -4184,6 +4176,56 @@
                 <a:extLst>
                   <a:ext uri="{0D108BD9-81ED-4DB2-BD59-A6C34878D82A}">
                     <a16:rowId xmlns:a16="http://schemas.microsoft.com/office/drawing/2014/main" val="458982605"/>
+                  </a:ext>
+                </a:extLst>
+              </a:tr>
+              <a:tr h="323265">
+                <a:tc>
+                  <a:txBody>
+                    <a:bodyPr/>
+                    <a:lstStyle/>
+                    <a:p>
+                      <a:r>
+                        <a:rPr lang="en-US" sz="1600"/>
+                        <a:t>f_equal</a:t>
+                      </a:r>
+                    </a:p>
+                  </a:txBody>
+                  <a:tcPr/>
+                </a:tc>
+                <a:tc>
+                  <a:txBody>
+                    <a:bodyPr/>
+                    <a:lstStyle/>
+                    <a:p>
+                      <a:pPr marL="0" marR="0" lvl="0" indent="0" algn="l" defTabSz="914400" rtl="0" eaLnBrk="1" fontAlgn="auto" latinLnBrk="0" hangingPunct="1">
+                        <a:lnSpc>
+                          <a:spcPct val="100000"/>
+                        </a:lnSpc>
+                        <a:spcBef>
+                          <a:spcPts val="0"/>
+                        </a:spcBef>
+                        <a:spcAft>
+                          <a:spcPts val="0"/>
+                        </a:spcAft>
+                        <a:buClrTx/>
+                        <a:buSzTx/>
+                        <a:buFontTx/>
+                        <a:buNone/>
+                        <a:tabLst/>
+                        <a:defRPr/>
+                      </a:pPr>
+                      <a:r>
+                        <a:rPr lang="en-US" sz="1600"/>
+                        <a:t>apply congrArg</a:t>
+                      </a:r>
+                    </a:p>
+                  </a:txBody>
+                  <a:tcPr/>
+                </a:tc>
+                <a:extLst>
+                  <a:ext uri="{0D108BD9-81ED-4DB2-BD59-A6C34878D82A}">
+                    <a16:rowId xmlns:a16="http://schemas.microsoft.com/office/drawing/2014/main" val="1455633390"/>
                   </a:ext>
                 </a:extLst>
               </a:tr>
@@ -4206,14 +4248,14 @@
           <p:nvPr>
             <p:extLst>
               <p:ext uri="{D42A27DB-BD31-4B8C-83A1-F6EECF244321}">
-                <p14:modId xmlns:p14="http://schemas.microsoft.com/office/powerpoint/2010/main" val="2621677736"/>
+                <p14:modId xmlns:p14="http://schemas.microsoft.com/office/powerpoint/2010/main" val="4100625175"/>
               </p:ext>
             </p:extLst>
           </p:nvPr>
         </p:nvGraphicFramePr>
         <p:xfrm>
           <a:off x="4019618" y="58929"/>
-          <a:ext cx="1437205" cy="4597846"/>
+          <a:ext cx="1437205" cy="5029200"/>
         </p:xfrm>
         <a:graphic>
           <a:graphicData uri="http://schemas.openxmlformats.org/drawingml/2006/table">
@@ -4230,14 +4272,14 @@
                   </a:extLst>
                 </a:gridCol>
               </a:tblGrid>
-              <a:tr h="351694">
+              <a:tr h="302595">
                 <a:tc>
                   <a:txBody>
                     <a:bodyPr/>
                     <a:lstStyle/>
                     <a:p>
                       <a:r>
-                        <a:rPr lang="en-US" sz="1700"/>
+                        <a:rPr lang="en-US" sz="1600"/>
                         <a:t>same</a:t>
                       </a:r>
                     </a:p>
@@ -4250,14 +4292,14 @@
                   </a:ext>
                 </a:extLst>
               </a:tr>
-              <a:tr h="353846">
+              <a:tr h="304447">
                 <a:tc>
                   <a:txBody>
                     <a:bodyPr/>
                     <a:lstStyle/>
                     <a:p>
                       <a:r>
-                        <a:rPr lang="en-US" sz="1700"/>
+                        <a:rPr lang="en-US" sz="1600"/>
                         <a:t>exact</a:t>
                       </a:r>
                     </a:p>
@@ -4270,14 +4312,14 @@
                   </a:ext>
                 </a:extLst>
               </a:tr>
-              <a:tr h="353846">
+              <a:tr h="304447">
                 <a:tc>
                   <a:txBody>
                     <a:bodyPr/>
                     <a:lstStyle/>
                     <a:p>
                       <a:r>
-                        <a:rPr lang="en-US" sz="1700"/>
+                        <a:rPr lang="en-US" sz="1600"/>
                         <a:t>apply</a:t>
                       </a:r>
                     </a:p>
@@ -4290,14 +4332,14 @@
                   </a:ext>
                 </a:extLst>
               </a:tr>
-              <a:tr h="353846">
+              <a:tr h="304447">
                 <a:tc>
                   <a:txBody>
                     <a:bodyPr/>
                     <a:lstStyle/>
                     <a:p>
                       <a:r>
-                        <a:rPr lang="en-US" sz="1700"/>
+                        <a:rPr lang="en-US" sz="1600"/>
                         <a:t>intros</a:t>
                       </a:r>
                     </a:p>
@@ -4310,14 +4352,14 @@
                   </a:ext>
                 </a:extLst>
               </a:tr>
-              <a:tr h="353846">
+              <a:tr h="304447">
                 <a:tc>
                   <a:txBody>
                     <a:bodyPr/>
                     <a:lstStyle/>
                     <a:p>
                       <a:r>
-                        <a:rPr lang="en-US" sz="1700"/>
+                        <a:rPr lang="en-US" sz="1600"/>
                         <a:t>assumption</a:t>
                       </a:r>
                     </a:p>
@@ -4330,14 +4372,14 @@
                   </a:ext>
                 </a:extLst>
               </a:tr>
-              <a:tr h="353846">
+              <a:tr h="304447">
                 <a:tc>
                   <a:txBody>
                     <a:bodyPr/>
                     <a:lstStyle/>
                     <a:p>
                       <a:r>
-                        <a:rPr lang="en-US" sz="1700"/>
+                        <a:rPr lang="en-US" sz="1600"/>
                         <a:t>unfold</a:t>
                       </a:r>
                     </a:p>
@@ -4350,14 +4392,14 @@
                   </a:ext>
                 </a:extLst>
               </a:tr>
-              <a:tr h="353846">
+              <a:tr h="304447">
                 <a:tc>
                   <a:txBody>
                     <a:bodyPr/>
                     <a:lstStyle/>
                     <a:p>
                       <a:r>
-                        <a:rPr lang="en-GB" sz="1700" b="0" i="0" kern="1200">
+                        <a:rPr lang="en-GB" sz="1600" b="0" i="0" kern="1200">
                           <a:solidFill>
                             <a:schemeClr val="dk1"/>
                           </a:solidFill>
@@ -4368,7 +4410,7 @@
                         </a:rPr>
                         <a:t>contradiction</a:t>
                       </a:r>
-                      <a:endParaRPr lang="en-US" sz="1700"/>
+                      <a:endParaRPr lang="en-US" sz="1600"/>
                     </a:p>
                   </a:txBody>
                   <a:tcPr/>
@@ -4379,14 +4421,14 @@
                   </a:ext>
                 </a:extLst>
               </a:tr>
-              <a:tr h="353846">
+              <a:tr h="304447">
                 <a:tc>
                   <a:txBody>
                     <a:bodyPr/>
                     <a:lstStyle/>
                     <a:p>
                       <a:r>
-                        <a:rPr lang="en-GB" sz="1700" b="0" i="0" kern="1200">
+                        <a:rPr lang="en-GB" sz="1600" b="0" i="0" kern="1200">
                           <a:solidFill>
                             <a:schemeClr val="dk1"/>
                           </a:solidFill>
@@ -4397,7 +4439,7 @@
                         </a:rPr>
                         <a:t>constructor</a:t>
                       </a:r>
-                      <a:endParaRPr lang="en-US" sz="1700"/>
+                      <a:endParaRPr lang="en-US" sz="1600"/>
                     </a:p>
                   </a:txBody>
                   <a:tcPr/>
@@ -4408,14 +4450,14 @@
                   </a:ext>
                 </a:extLst>
               </a:tr>
-              <a:tr h="353846">
+              <a:tr h="304447">
                 <a:tc>
                   <a:txBody>
                     <a:bodyPr/>
                     <a:lstStyle/>
                     <a:p>
                       <a:r>
-                        <a:rPr lang="en-GB" sz="1700" b="0" i="0" kern="1200">
+                        <a:rPr lang="en-GB" sz="1600" b="0" i="0" kern="1200">
                           <a:solidFill>
                             <a:schemeClr val="dk1"/>
                           </a:solidFill>
@@ -4426,7 +4468,7 @@
                         </a:rPr>
                         <a:t>induction</a:t>
                       </a:r>
-                      <a:endParaRPr lang="en-US" sz="1700"/>
+                      <a:endParaRPr lang="en-US" sz="1600"/>
                     </a:p>
                   </a:txBody>
                   <a:tcPr/>
@@ -4437,14 +4479,14 @@
                   </a:ext>
                 </a:extLst>
               </a:tr>
-              <a:tr h="353846">
+              <a:tr h="304447">
                 <a:tc>
                   <a:txBody>
                     <a:bodyPr/>
                     <a:lstStyle/>
                     <a:p>
                       <a:r>
-                        <a:rPr lang="en-GB" sz="1700" b="0" i="0" kern="1200">
+                        <a:rPr lang="en-GB" sz="1600" b="0" i="0" kern="1200">
                           <a:solidFill>
                             <a:schemeClr val="dk1"/>
                           </a:solidFill>
@@ -4455,7 +4497,7 @@
                         </a:rPr>
                         <a:t>repeat</a:t>
                       </a:r>
-                      <a:endParaRPr lang="en-US" sz="1700"/>
+                      <a:endParaRPr lang="en-US" sz="1600"/>
                     </a:p>
                   </a:txBody>
                   <a:tcPr/>
@@ -4466,14 +4508,14 @@
                   </a:ext>
                 </a:extLst>
               </a:tr>
-              <a:tr h="353846">
+              <a:tr h="304447">
                 <a:tc>
                   <a:txBody>
                     <a:bodyPr/>
                     <a:lstStyle/>
                     <a:p>
                       <a:r>
-                        <a:rPr lang="en-US" sz="1700"/>
+                        <a:rPr lang="en-US" sz="1600"/>
                         <a:t>try</a:t>
                       </a:r>
                     </a:p>
@@ -4486,14 +4528,14 @@
                   </a:ext>
                 </a:extLst>
               </a:tr>
-              <a:tr h="353846">
+              <a:tr h="304447">
                 <a:tc>
                   <a:txBody>
                     <a:bodyPr/>
                     <a:lstStyle/>
                     <a:p>
                       <a:r>
-                        <a:rPr lang="en-GB" sz="1700" b="0" i="0" kern="1200">
+                        <a:rPr lang="en-GB" sz="1600" b="0" i="0" kern="1200">
                           <a:solidFill>
                             <a:schemeClr val="dk1"/>
                           </a:solidFill>
@@ -4504,7 +4546,7 @@
                         </a:rPr>
                         <a:t>refine</a:t>
                       </a:r>
-                      <a:endParaRPr lang="en-US" sz="1700"/>
+                      <a:endParaRPr lang="en-US" sz="1600"/>
                     </a:p>
                   </a:txBody>
                   <a:tcPr/>
@@ -4515,14 +4557,14 @@
                   </a:ext>
                 </a:extLst>
               </a:tr>
-              <a:tr h="353846">
+              <a:tr h="304447">
                 <a:tc>
                   <a:txBody>
                     <a:bodyPr/>
                     <a:lstStyle/>
                     <a:p>
                       <a:r>
-                        <a:rPr lang="en-GB" sz="1700" b="0" i="0" kern="1200">
+                        <a:rPr lang="en-GB" sz="1600" b="0" i="0" kern="1200">
                           <a:solidFill>
                             <a:schemeClr val="dk1"/>
                           </a:solidFill>
@@ -4533,7 +4575,7 @@
                         </a:rPr>
                         <a:t>specialize</a:t>
                       </a:r>
-                      <a:endParaRPr lang="en-US" sz="1700"/>
+                      <a:endParaRPr lang="en-US" sz="1600"/>
                     </a:p>
                   </a:txBody>
                   <a:tcPr/>
@@ -4541,6 +4583,46 @@
                 <a:extLst>
                   <a:ext uri="{0D108BD9-81ED-4DB2-BD59-A6C34878D82A}">
                     <a16:rowId xmlns:a16="http://schemas.microsoft.com/office/drawing/2014/main" val="3629224648"/>
+                  </a:ext>
+                </a:extLst>
+              </a:tr>
+              <a:tr h="304447">
+                <a:tc>
+                  <a:txBody>
+                    <a:bodyPr/>
+                    <a:lstStyle/>
+                    <a:p>
+                      <a:r>
+                        <a:rPr lang="en-US" sz="1600"/>
+                        <a:t>clear</a:t>
+                      </a:r>
+                    </a:p>
+                  </a:txBody>
+                  <a:tcPr/>
+                </a:tc>
+                <a:extLst>
+                  <a:ext uri="{0D108BD9-81ED-4DB2-BD59-A6C34878D82A}">
+                    <a16:rowId xmlns:a16="http://schemas.microsoft.com/office/drawing/2014/main" val="547478236"/>
+                  </a:ext>
+                </a:extLst>
+              </a:tr>
+              <a:tr h="304447">
+                <a:tc>
+                  <a:txBody>
+                    <a:bodyPr/>
+                    <a:lstStyle/>
+                    <a:p>
+                      <a:r>
+                        <a:rPr lang="en-US" sz="1600"/>
+                        <a:t>trivial</a:t>
+                      </a:r>
+                    </a:p>
+                  </a:txBody>
+                  <a:tcPr/>
+                </a:tc>
+                <a:extLst>
+                  <a:ext uri="{0D108BD9-81ED-4DB2-BD59-A6C34878D82A}">
+                    <a16:rowId xmlns:a16="http://schemas.microsoft.com/office/drawing/2014/main" val="1241912431"/>
                   </a:ext>
                 </a:extLst>
               </a:tr>
@@ -4563,14 +4645,14 @@
           <p:nvPr>
             <p:extLst>
               <p:ext uri="{D42A27DB-BD31-4B8C-83A1-F6EECF244321}">
-                <p14:modId xmlns:p14="http://schemas.microsoft.com/office/powerpoint/2010/main" val="1050549768"/>
+                <p14:modId xmlns:p14="http://schemas.microsoft.com/office/powerpoint/2010/main" val="2333260131"/>
               </p:ext>
             </p:extLst>
           </p:nvPr>
         </p:nvGraphicFramePr>
         <p:xfrm>
           <a:off x="5485782" y="58929"/>
-          <a:ext cx="1803796" cy="1762820"/>
+          <a:ext cx="1803796" cy="1676400"/>
         </p:xfrm>
         <a:graphic>
           <a:graphicData uri="http://schemas.openxmlformats.org/drawingml/2006/table">
@@ -4587,14 +4669,14 @@
                   </a:extLst>
                 </a:gridCol>
               </a:tblGrid>
-              <a:tr h="352564">
+              <a:tr h="225595">
                 <a:tc>
                   <a:txBody>
                     <a:bodyPr/>
                     <a:lstStyle/>
                     <a:p>
                       <a:r>
-                        <a:rPr lang="en-US" sz="1700"/>
+                        <a:rPr lang="en-US" sz="1600"/>
                         <a:t>requires mathlib</a:t>
                       </a:r>
                     </a:p>
@@ -4607,14 +4689,14 @@
                   </a:ext>
                 </a:extLst>
               </a:tr>
-              <a:tr h="352564">
+              <a:tr h="225595">
                 <a:tc>
                   <a:txBody>
                     <a:bodyPr/>
                     <a:lstStyle/>
                     <a:p>
                       <a:r>
-                        <a:rPr lang="en-US" sz="1700"/>
+                        <a:rPr lang="en-US" sz="1600"/>
                         <a:t>left, right</a:t>
                       </a:r>
                     </a:p>
@@ -4627,14 +4709,14 @@
                   </a:ext>
                 </a:extLst>
               </a:tr>
-              <a:tr h="352564">
+              <a:tr h="225595">
                 <a:tc>
                   <a:txBody>
                     <a:bodyPr/>
                     <a:lstStyle/>
                     <a:p>
                       <a:r>
-                        <a:rPr lang="en-US" sz="1700"/>
+                        <a:rPr lang="en-US" sz="1600"/>
                         <a:t>ring</a:t>
                       </a:r>
                     </a:p>
@@ -4647,14 +4729,14 @@
                   </a:ext>
                 </a:extLst>
               </a:tr>
-              <a:tr h="352564">
+              <a:tr h="225595">
                 <a:tc>
                   <a:txBody>
                     <a:bodyPr/>
                     <a:lstStyle/>
                     <a:p>
                       <a:r>
-                        <a:rPr lang="en-US" sz="1700"/>
+                        <a:rPr lang="en-US" sz="1600"/>
                         <a:t>exists (use)</a:t>
                       </a:r>
                     </a:p>
@@ -4667,14 +4749,14 @@
                   </a:ext>
                 </a:extLst>
               </a:tr>
-              <a:tr h="352564">
+              <a:tr h="225595">
                 <a:tc>
                   <a:txBody>
                     <a:bodyPr/>
                     <a:lstStyle/>
                     <a:p>
                       <a:r>
-                        <a:rPr lang="en-US" sz="1700"/>
+                        <a:rPr lang="en-US" sz="1600"/>
                         <a:t>lia (linarith)</a:t>
                       </a:r>
                     </a:p>
@@ -4749,7 +4831,7 @@
         </p:blipFill>
         <p:spPr>
           <a:xfrm>
-            <a:off x="3120294" y="5029922"/>
+            <a:off x="3120294" y="5120758"/>
             <a:ext cx="5150050" cy="1604932"/>
           </a:xfrm>
           <a:prstGeom prst="rect">

</xml_diff>